<commit_message>
Updates on some missing plots
</commit_message>
<xml_diff>
--- a/WPG_output/Hasan_Mono/Hasan_Mono_Demo.pptx
+++ b/WPG_output/Hasan_Mono/Hasan_Mono_Demo.pptx
@@ -325,7 +325,7 @@
             <a:fld id="{4FEBF33E-D9A7-42CC-B598-9AD8356CBB5A}" type="datetimeFigureOut">
               <a:rPr lang="en-US" smtClean="0"/>
               <a:pPr/>
-              <a:t>6/4/2020</a:t>
+              <a:t>6/5/2020</a:t>
             </a:fld>
             <a:endParaRPr lang="en-US"/>
           </a:p>
@@ -488,7 +488,7 @@
             <a:fld id="{C3B58700-9FA2-48CE-AC88-D71D45EB490A}" type="datetimeFigureOut">
               <a:rPr lang="en-US" smtClean="0"/>
               <a:pPr/>
-              <a:t>6/4/2020</a:t>
+              <a:t>6/5/2020</a:t>
             </a:fld>
             <a:endParaRPr lang="en-US" dirty="0"/>
           </a:p>
@@ -5326,8 +5326,8 @@
           </a:p>
         </p:txBody>
       </p:sp>
-      <mc:AlternateContent xmlns:mc="http://schemas.openxmlformats.org/markup-compatibility/2006">
-        <mc:Choice xmlns:a14="http://schemas.microsoft.com/office/drawing/2010/main" Requires="a14">
+      <mc:AlternateContent xmlns:mc="http://schemas.openxmlformats.org/markup-compatibility/2006" xmlns:a14="http://schemas.microsoft.com/office/drawing/2010/main">
+        <mc:Choice Requires="a14">
           <p:sp>
             <p:nvSpPr>
               <p:cNvPr id="30" name="Content Placeholder 29"/>
@@ -5715,7 +5715,7 @@
             </p:txBody>
           </p:sp>
         </mc:Choice>
-        <mc:Fallback>
+        <mc:Fallback xmlns="">
           <p:sp>
             <p:nvSpPr>
               <p:cNvPr id="30" name="Content Placeholder 29"/>
@@ -11241,6 +11241,15 @@
 </file>
 
 <file path=customXml/item2.xml><?xml version="1.0" encoding="utf-8"?>
+<?mso-contentType ?>
+<FormTemplates xmlns="http://schemas.microsoft.com/sharepoint/v3/contenttype/forms">
+  <Display>DocumentLibraryForm</Display>
+  <Edit>DocumentLibraryForm</Edit>
+  <New>DocumentLibraryForm</New>
+</FormTemplates>
+</file>
+
+<file path=customXml/item3.xml><?xml version="1.0" encoding="utf-8"?>
 <ct:contentTypeSchema xmlns:ct="http://schemas.microsoft.com/office/2006/metadata/contentType" xmlns:ma="http://schemas.microsoft.com/office/2006/metadata/properties/metaAttributes" ct:_="" ma:_="" ma:contentTypeName="Document" ma:contentTypeID="0x0101003309C022A5BACE4D8A86646BFE6F373A" ma:contentTypeVersion="6" ma:contentTypeDescription="Create a new document." ma:contentTypeScope="" ma:versionID="fa09eca8e9885d653412965b564ef40e">
   <xsd:schema xmlns:xsd="http://www.w3.org/2001/XMLSchema" xmlns:xs="http://www.w3.org/2001/XMLSchema" xmlns:p="http://schemas.microsoft.com/office/2006/metadata/properties" xmlns:ns1="http://schemas.microsoft.com/sharepoint/v3" xmlns:ns2="be4c3ea6-cad5-4867-91d9-7216788d6e80" targetNamespace="http://schemas.microsoft.com/office/2006/metadata/properties" ma:root="true" ma:fieldsID="5e650a32204f281424193f6b0635a9f5" ns1:_="" ns2:_="">
     <xsd:import namespace="http://schemas.microsoft.com/sharepoint/v3"/>
@@ -11414,15 +11423,6 @@
 </ct:contentTypeSchema>
 </file>
 
-<file path=customXml/item3.xml><?xml version="1.0" encoding="utf-8"?>
-<?mso-contentType ?>
-<FormTemplates xmlns="http://schemas.microsoft.com/sharepoint/v3/contenttype/forms">
-  <Display>DocumentLibraryForm</Display>
-  <Edit>DocumentLibraryForm</Edit>
-  <New>DocumentLibraryForm</New>
-</FormTemplates>
-</file>
-
 <file path=customXml/itemProps1.xml><?xml version="1.0" encoding="utf-8"?>
 <ds:datastoreItem xmlns:ds="http://schemas.openxmlformats.org/officeDocument/2006/customXml" ds:itemID="{B5DC465C-0AFA-4B02-8D00-CB14DF55DD98}">
   <ds:schemaRefs>
@@ -11435,6 +11435,14 @@
 </file>
 
 <file path=customXml/itemProps2.xml><?xml version="1.0" encoding="utf-8"?>
+<ds:datastoreItem xmlns:ds="http://schemas.openxmlformats.org/officeDocument/2006/customXml" ds:itemID="{0D38D205-A273-4ABA-A83A-77DB3B1F8800}">
+  <ds:schemaRefs>
+    <ds:schemaRef ds:uri="http://schemas.microsoft.com/sharepoint/v3/contenttype/forms"/>
+  </ds:schemaRefs>
+</ds:datastoreItem>
+</file>
+
+<file path=customXml/itemProps3.xml><?xml version="1.0" encoding="utf-8"?>
 <ds:datastoreItem xmlns:ds="http://schemas.openxmlformats.org/officeDocument/2006/customXml" ds:itemID="{320C2239-B20E-4DE6-814B-AECCA40A802B}">
   <ds:schemaRefs>
     <ds:schemaRef ds:uri="http://schemas.microsoft.com/office/2006/metadata/contentType"/>
@@ -11451,12 +11459,4 @@
     <ds:schemaRef ds:uri="http://schemas.microsoft.com/internal/obd"/>
   </ds:schemaRefs>
 </ds:datastoreItem>
-</file>
-
-<file path=customXml/itemProps3.xml><?xml version="1.0" encoding="utf-8"?>
-<ds:datastoreItem xmlns:ds="http://schemas.openxmlformats.org/officeDocument/2006/customXml" ds:itemID="{0D38D205-A273-4ABA-A83A-77DB3B1F8800}">
-  <ds:schemaRefs>
-    <ds:schemaRef ds:uri="http://schemas.microsoft.com/sharepoint/v3/contenttype/forms"/>
-  </ds:schemaRefs>
-</ds:datastoreItem>
 </file>
</xml_diff>

<commit_message>
Updates on beam temporal tail after channel cut crystals
</commit_message>
<xml_diff>
--- a/WPG_output/Hasan_Mono/Hasan_Mono_Demo.pptx
+++ b/WPG_output/Hasan_Mono/Hasan_Mono_Demo.pptx
@@ -325,7 +325,7 @@
             <a:fld id="{4FEBF33E-D9A7-42CC-B598-9AD8356CBB5A}" type="datetimeFigureOut">
               <a:rPr lang="en-US" smtClean="0"/>
               <a:pPr/>
-              <a:t>6/5/2020</a:t>
+              <a:t>6/11/2020</a:t>
             </a:fld>
             <a:endParaRPr lang="en-US"/>
           </a:p>
@@ -488,7 +488,7 @@
             <a:fld id="{C3B58700-9FA2-48CE-AC88-D71D45EB490A}" type="datetimeFigureOut">
               <a:rPr lang="en-US" smtClean="0"/>
               <a:pPr/>
-              <a:t>6/5/2020</a:t>
+              <a:t>6/11/2020</a:t>
             </a:fld>
             <a:endParaRPr lang="en-US" dirty="0"/>
           </a:p>
@@ -11241,15 +11241,6 @@
 </file>
 
 <file path=customXml/item2.xml><?xml version="1.0" encoding="utf-8"?>
-<?mso-contentType ?>
-<FormTemplates xmlns="http://schemas.microsoft.com/sharepoint/v3/contenttype/forms">
-  <Display>DocumentLibraryForm</Display>
-  <Edit>DocumentLibraryForm</Edit>
-  <New>DocumentLibraryForm</New>
-</FormTemplates>
-</file>
-
-<file path=customXml/item3.xml><?xml version="1.0" encoding="utf-8"?>
 <ct:contentTypeSchema xmlns:ct="http://schemas.microsoft.com/office/2006/metadata/contentType" xmlns:ma="http://schemas.microsoft.com/office/2006/metadata/properties/metaAttributes" ct:_="" ma:_="" ma:contentTypeName="Document" ma:contentTypeID="0x0101003309C022A5BACE4D8A86646BFE6F373A" ma:contentTypeVersion="6" ma:contentTypeDescription="Create a new document." ma:contentTypeScope="" ma:versionID="fa09eca8e9885d653412965b564ef40e">
   <xsd:schema xmlns:xsd="http://www.w3.org/2001/XMLSchema" xmlns:xs="http://www.w3.org/2001/XMLSchema" xmlns:p="http://schemas.microsoft.com/office/2006/metadata/properties" xmlns:ns1="http://schemas.microsoft.com/sharepoint/v3" xmlns:ns2="be4c3ea6-cad5-4867-91d9-7216788d6e80" targetNamespace="http://schemas.microsoft.com/office/2006/metadata/properties" ma:root="true" ma:fieldsID="5e650a32204f281424193f6b0635a9f5" ns1:_="" ns2:_="">
     <xsd:import namespace="http://schemas.microsoft.com/sharepoint/v3"/>
@@ -11423,6 +11414,15 @@
 </ct:contentTypeSchema>
 </file>
 
+<file path=customXml/item3.xml><?xml version="1.0" encoding="utf-8"?>
+<?mso-contentType ?>
+<FormTemplates xmlns="http://schemas.microsoft.com/sharepoint/v3/contenttype/forms">
+  <Display>DocumentLibraryForm</Display>
+  <Edit>DocumentLibraryForm</Edit>
+  <New>DocumentLibraryForm</New>
+</FormTemplates>
+</file>
+
 <file path=customXml/itemProps1.xml><?xml version="1.0" encoding="utf-8"?>
 <ds:datastoreItem xmlns:ds="http://schemas.openxmlformats.org/officeDocument/2006/customXml" ds:itemID="{B5DC465C-0AFA-4B02-8D00-CB14DF55DD98}">
   <ds:schemaRefs>
@@ -11435,14 +11435,6 @@
 </file>
 
 <file path=customXml/itemProps2.xml><?xml version="1.0" encoding="utf-8"?>
-<ds:datastoreItem xmlns:ds="http://schemas.openxmlformats.org/officeDocument/2006/customXml" ds:itemID="{0D38D205-A273-4ABA-A83A-77DB3B1F8800}">
-  <ds:schemaRefs>
-    <ds:schemaRef ds:uri="http://schemas.microsoft.com/sharepoint/v3/contenttype/forms"/>
-  </ds:schemaRefs>
-</ds:datastoreItem>
-</file>
-
-<file path=customXml/itemProps3.xml><?xml version="1.0" encoding="utf-8"?>
 <ds:datastoreItem xmlns:ds="http://schemas.openxmlformats.org/officeDocument/2006/customXml" ds:itemID="{320C2239-B20E-4DE6-814B-AECCA40A802B}">
   <ds:schemaRefs>
     <ds:schemaRef ds:uri="http://schemas.microsoft.com/office/2006/metadata/contentType"/>
@@ -11459,4 +11451,12 @@
     <ds:schemaRef ds:uri="http://schemas.microsoft.com/internal/obd"/>
   </ds:schemaRefs>
 </ds:datastoreItem>
+</file>
+
+<file path=customXml/itemProps3.xml><?xml version="1.0" encoding="utf-8"?>
+<ds:datastoreItem xmlns:ds="http://schemas.openxmlformats.org/officeDocument/2006/customXml" ds:itemID="{0D38D205-A273-4ABA-A83A-77DB3B1F8800}">
+  <ds:schemaRefs>
+    <ds:schemaRef ds:uri="http://schemas.microsoft.com/sharepoint/v3/contenttype/forms"/>
+  </ds:schemaRefs>
+</ds:datastoreItem>
 </file>
</xml_diff>